<commit_message>
checked the updateFormattingOnEntireLine method and modified it to account for the point where the left text meets the right text. Also created new method (findOverHangFromAvgCharWidth) to provide a more efficient method of finding the position of the overhang within the text
</commit_message>
<xml_diff>
--- a/textbox guide.pptx
+++ b/textbox guide.pptx
@@ -21,6 +21,12 @@
     <p:sldId id="265" r:id="rId15"/>
     <p:sldId id="270" r:id="rId16"/>
     <p:sldId id="271" r:id="rId17"/>
+    <p:sldId id="272" r:id="rId18"/>
+    <p:sldId id="273" r:id="rId19"/>
+    <p:sldId id="275" r:id="rId20"/>
+    <p:sldId id="274" r:id="rId21"/>
+    <p:sldId id="276" r:id="rId22"/>
+    <p:sldId id="277" r:id="rId23"/>
   </p:sldIdLst>
   <p:sldSz cx="12192000" cy="6858000"/>
   <p:notesSz cx="6858000" cy="9144000"/>
@@ -276,7 +282,7 @@
           <a:p>
             <a:fld id="{F34C7B2E-2098-114E-B51F-70D91FD20D5A}" type="datetimeFigureOut">
               <a:rPr lang="en-US" smtClean="0"/>
-              <a:t>9/7/20</a:t>
+              <a:t>9/8/20</a:t>
             </a:fld>
             <a:endParaRPr lang="en-US"/>
           </a:p>
@@ -476,7 +482,7 @@
           <a:p>
             <a:fld id="{F34C7B2E-2098-114E-B51F-70D91FD20D5A}" type="datetimeFigureOut">
               <a:rPr lang="en-US" smtClean="0"/>
-              <a:t>9/7/20</a:t>
+              <a:t>9/8/20</a:t>
             </a:fld>
             <a:endParaRPr lang="en-US"/>
           </a:p>
@@ -686,7 +692,7 @@
           <a:p>
             <a:fld id="{F34C7B2E-2098-114E-B51F-70D91FD20D5A}" type="datetimeFigureOut">
               <a:rPr lang="en-US" smtClean="0"/>
-              <a:t>9/7/20</a:t>
+              <a:t>9/8/20</a:t>
             </a:fld>
             <a:endParaRPr lang="en-US"/>
           </a:p>
@@ -886,7 +892,7 @@
           <a:p>
             <a:fld id="{F34C7B2E-2098-114E-B51F-70D91FD20D5A}" type="datetimeFigureOut">
               <a:rPr lang="en-US" smtClean="0"/>
-              <a:t>9/7/20</a:t>
+              <a:t>9/8/20</a:t>
             </a:fld>
             <a:endParaRPr lang="en-US"/>
           </a:p>
@@ -1162,7 +1168,7 @@
           <a:p>
             <a:fld id="{F34C7B2E-2098-114E-B51F-70D91FD20D5A}" type="datetimeFigureOut">
               <a:rPr lang="en-US" smtClean="0"/>
-              <a:t>9/7/20</a:t>
+              <a:t>9/8/20</a:t>
             </a:fld>
             <a:endParaRPr lang="en-US"/>
           </a:p>
@@ -1430,7 +1436,7 @@
           <a:p>
             <a:fld id="{F34C7B2E-2098-114E-B51F-70D91FD20D5A}" type="datetimeFigureOut">
               <a:rPr lang="en-US" smtClean="0"/>
-              <a:t>9/7/20</a:t>
+              <a:t>9/8/20</a:t>
             </a:fld>
             <a:endParaRPr lang="en-US"/>
           </a:p>
@@ -1845,7 +1851,7 @@
           <a:p>
             <a:fld id="{F34C7B2E-2098-114E-B51F-70D91FD20D5A}" type="datetimeFigureOut">
               <a:rPr lang="en-US" smtClean="0"/>
-              <a:t>9/7/20</a:t>
+              <a:t>9/8/20</a:t>
             </a:fld>
             <a:endParaRPr lang="en-US"/>
           </a:p>
@@ -1987,7 +1993,7 @@
           <a:p>
             <a:fld id="{F34C7B2E-2098-114E-B51F-70D91FD20D5A}" type="datetimeFigureOut">
               <a:rPr lang="en-US" smtClean="0"/>
-              <a:t>9/7/20</a:t>
+              <a:t>9/8/20</a:t>
             </a:fld>
             <a:endParaRPr lang="en-US"/>
           </a:p>
@@ -2100,7 +2106,7 @@
           <a:p>
             <a:fld id="{F34C7B2E-2098-114E-B51F-70D91FD20D5A}" type="datetimeFigureOut">
               <a:rPr lang="en-US" smtClean="0"/>
-              <a:t>9/7/20</a:t>
+              <a:t>9/8/20</a:t>
             </a:fld>
             <a:endParaRPr lang="en-US"/>
           </a:p>
@@ -2413,7 +2419,7 @@
           <a:p>
             <a:fld id="{F34C7B2E-2098-114E-B51F-70D91FD20D5A}" type="datetimeFigureOut">
               <a:rPr lang="en-US" smtClean="0"/>
-              <a:t>9/7/20</a:t>
+              <a:t>9/8/20</a:t>
             </a:fld>
             <a:endParaRPr lang="en-US"/>
           </a:p>
@@ -2702,7 +2708,7 @@
           <a:p>
             <a:fld id="{F34C7B2E-2098-114E-B51F-70D91FD20D5A}" type="datetimeFigureOut">
               <a:rPr lang="en-US" smtClean="0"/>
-              <a:t>9/7/20</a:t>
+              <a:t>9/8/20</a:t>
             </a:fld>
             <a:endParaRPr lang="en-US"/>
           </a:p>
@@ -2945,7 +2951,7 @@
           <a:p>
             <a:fld id="{F34C7B2E-2098-114E-B51F-70D91FD20D5A}" type="datetimeFigureOut">
               <a:rPr lang="en-US" smtClean="0"/>
-              <a:t>9/7/20</a:t>
+              <a:t>9/8/20</a:t>
             </a:fld>
             <a:endParaRPr lang="en-US"/>
           </a:p>
@@ -3944,6 +3950,88 @@
           </a:p>
         </p:txBody>
       </p:sp>
+      <p:sp>
+        <p:nvSpPr>
+          <p:cNvPr id="17" name="TextBox 16">
+            <a:extLst>
+              <a:ext uri="{FF2B5EF4-FFF2-40B4-BE49-F238E27FC236}">
+                <a16:creationId xmlns:a16="http://schemas.microsoft.com/office/drawing/2014/main" id="{789F7A16-6B51-7B4E-AF5B-5962B1FB42BB}"/>
+              </a:ext>
+            </a:extLst>
+          </p:cNvPr>
+          <p:cNvSpPr txBox="1"/>
+          <p:nvPr/>
+        </p:nvSpPr>
+        <p:spPr>
+          <a:xfrm>
+            <a:off x="7819689" y="5385277"/>
+            <a:ext cx="3823547" cy="369332"/>
+          </a:xfrm>
+          <a:prstGeom prst="rect">
+            <a:avLst/>
+          </a:prstGeom>
+          <a:noFill/>
+          <a:ln>
+            <a:solidFill>
+              <a:schemeClr val="tx1"/>
+            </a:solidFill>
+          </a:ln>
+        </p:spPr>
+        <p:txBody>
+          <a:bodyPr wrap="none" rtlCol="0">
+            <a:spAutoFit/>
+          </a:bodyPr>
+          <a:lstStyle/>
+          <a:p>
+            <a:r>
+              <a:rPr lang="en-US" dirty="0" err="1"/>
+              <a:t>findOverHangEntryFromAvgCharWidth</a:t>
+            </a:r>
+            <a:endParaRPr lang="en-US" dirty="0"/>
+          </a:p>
+        </p:txBody>
+      </p:sp>
+      <p:cxnSp>
+        <p:nvCxnSpPr>
+          <p:cNvPr id="18" name="Straight Arrow Connector 17">
+            <a:extLst>
+              <a:ext uri="{FF2B5EF4-FFF2-40B4-BE49-F238E27FC236}">
+                <a16:creationId xmlns:a16="http://schemas.microsoft.com/office/drawing/2014/main" id="{AD304102-9B60-6441-96E9-68D04AD2D610}"/>
+              </a:ext>
+            </a:extLst>
+          </p:cNvPr>
+          <p:cNvCxnSpPr>
+            <a:cxnSpLocks/>
+          </p:cNvCxnSpPr>
+          <p:nvPr/>
+        </p:nvCxnSpPr>
+        <p:spPr>
+          <a:xfrm flipH="1">
+            <a:off x="7067395" y="5564730"/>
+            <a:ext cx="752294" cy="0"/>
+          </a:xfrm>
+          <a:prstGeom prst="straightConnector1">
+            <a:avLst/>
+          </a:prstGeom>
+          <a:ln>
+            <a:tailEnd type="triangle"/>
+          </a:ln>
+        </p:spPr>
+        <p:style>
+          <a:lnRef idx="1">
+            <a:schemeClr val="dk1"/>
+          </a:lnRef>
+          <a:fillRef idx="0">
+            <a:schemeClr val="dk1"/>
+          </a:fillRef>
+          <a:effectRef idx="0">
+            <a:schemeClr val="dk1"/>
+          </a:effectRef>
+          <a:fontRef idx="minor">
+            <a:schemeClr val="tx1"/>
+          </a:fontRef>
+        </p:style>
+      </p:cxnSp>
     </p:spTree>
     <p:extLst>
       <p:ext uri="{BB962C8B-B14F-4D97-AF65-F5344CB8AC3E}">
@@ -6697,7 +6785,7 @@
             </a:r>
             <a:r>
               <a:rPr lang="en-GB" sz="1400" dirty="0" err="1"/>
-              <a:t>leftTextFormatInfo</a:t>
+              <a:t>rightTextFormatInfo</a:t>
             </a:r>
             <a:endParaRPr lang="en-GB" sz="1400" dirty="0"/>
           </a:p>
@@ -6718,7 +6806,7 @@
         <p:spPr>
           <a:xfrm>
             <a:off x="263785" y="813999"/>
-            <a:ext cx="1683602" cy="523220"/>
+            <a:ext cx="1683602" cy="738664"/>
           </a:xfrm>
           <a:prstGeom prst="rect">
             <a:avLst/>
@@ -6743,6 +6831,16 @@
             <a:r>
               <a:rPr lang="en-US" sz="1400" dirty="0"/>
               <a:t>:</a:t>
+            </a:r>
+          </a:p>
+          <a:p>
+            <a:pPr marL="285750" indent="-285750">
+              <a:buFont typeface="Arial" panose="020B0604020202020204" pitchFamily="34" charset="0"/>
+              <a:buChar char="•"/>
+            </a:pPr>
+            <a:r>
+              <a:rPr lang="en-US" sz="1400" dirty="0"/>
+              <a:t>[-1]</a:t>
             </a:r>
           </a:p>
           <a:p>
@@ -7269,10 +7367,1350 @@
           <a:chExt cx="0" cy="0"/>
         </a:xfrm>
       </p:grpSpPr>
+      <p:sp>
+        <p:nvSpPr>
+          <p:cNvPr id="2" name="TextBox 1">
+            <a:extLst>
+              <a:ext uri="{FF2B5EF4-FFF2-40B4-BE49-F238E27FC236}">
+                <a16:creationId xmlns:a16="http://schemas.microsoft.com/office/drawing/2014/main" id="{8E1719E1-5ED8-0343-99CF-761E89CA1613}"/>
+              </a:ext>
+            </a:extLst>
+          </p:cNvPr>
+          <p:cNvSpPr txBox="1"/>
+          <p:nvPr/>
+        </p:nvSpPr>
+        <p:spPr>
+          <a:xfrm>
+            <a:off x="318977" y="340242"/>
+            <a:ext cx="7047314" cy="646331"/>
+          </a:xfrm>
+          <a:prstGeom prst="rect">
+            <a:avLst/>
+          </a:prstGeom>
+          <a:noFill/>
+          <a:ln>
+            <a:solidFill>
+              <a:schemeClr val="tx1"/>
+            </a:solidFill>
+          </a:ln>
+        </p:spPr>
+        <p:txBody>
+          <a:bodyPr wrap="none" rtlCol="0">
+            <a:spAutoFit/>
+          </a:bodyPr>
+          <a:lstStyle/>
+          <a:p>
+            <a:pPr marL="285750" indent="-285750">
+              <a:buFont typeface="Arial" panose="020B0604020202020204" pitchFamily="34" charset="0"/>
+              <a:buChar char="•"/>
+            </a:pPr>
+            <a:r>
+              <a:rPr lang="en-US" dirty="0"/>
+              <a:t>Example from the last line from the </a:t>
+            </a:r>
+            <a:r>
+              <a:rPr lang="en-US" dirty="0" err="1"/>
+              <a:t>adjustCursorInformation</a:t>
+            </a:r>
+            <a:r>
+              <a:rPr lang="en-US" dirty="0"/>
+              <a:t> example:</a:t>
+            </a:r>
+          </a:p>
+          <a:p>
+            <a:pPr marL="285750" indent="-285750">
+              <a:buFont typeface="Arial" panose="020B0604020202020204" pitchFamily="34" charset="0"/>
+              <a:buChar char="•"/>
+            </a:pPr>
+            <a:r>
+              <a:rPr lang="en-US" dirty="0"/>
+              <a:t>Which updates the new right text formatting </a:t>
+            </a:r>
+            <a:r>
+              <a:rPr lang="en-US" dirty="0" err="1"/>
+              <a:t>entires</a:t>
+            </a:r>
+            <a:r>
+              <a:rPr lang="en-US" dirty="0"/>
+              <a:t>, for the first line.</a:t>
+            </a:r>
+          </a:p>
+        </p:txBody>
+      </p:sp>
+      <p:sp>
+        <p:nvSpPr>
+          <p:cNvPr id="3" name="TextBox 2">
+            <a:extLst>
+              <a:ext uri="{FF2B5EF4-FFF2-40B4-BE49-F238E27FC236}">
+                <a16:creationId xmlns:a16="http://schemas.microsoft.com/office/drawing/2014/main" id="{6B987CF8-F27F-7549-9B38-F297A07950FD}"/>
+              </a:ext>
+            </a:extLst>
+          </p:cNvPr>
+          <p:cNvSpPr txBox="1"/>
+          <p:nvPr/>
+        </p:nvSpPr>
+        <p:spPr>
+          <a:xfrm>
+            <a:off x="318977" y="1221386"/>
+            <a:ext cx="4498347" cy="369332"/>
+          </a:xfrm>
+          <a:prstGeom prst="rect">
+            <a:avLst/>
+          </a:prstGeom>
+          <a:noFill/>
+        </p:spPr>
+        <p:txBody>
+          <a:bodyPr wrap="none" rtlCol="0">
+            <a:spAutoFit/>
+          </a:bodyPr>
+          <a:lstStyle/>
+          <a:p>
+            <a:r>
+              <a:rPr lang="en-US" dirty="0" err="1"/>
+              <a:t>updateFormattingOnEntireLine</a:t>
+            </a:r>
+            <a:r>
+              <a:rPr lang="en-US" dirty="0"/>
+              <a:t>(false, 0, false) </a:t>
+            </a:r>
+          </a:p>
+        </p:txBody>
+      </p:sp>
+      <p:sp>
+        <p:nvSpPr>
+          <p:cNvPr id="5" name="TextBox 4">
+            <a:extLst>
+              <a:ext uri="{FF2B5EF4-FFF2-40B4-BE49-F238E27FC236}">
+                <a16:creationId xmlns:a16="http://schemas.microsoft.com/office/drawing/2014/main" id="{A1E6013A-C87E-9841-ADA1-7C2A30B73C40}"/>
+              </a:ext>
+            </a:extLst>
+          </p:cNvPr>
+          <p:cNvSpPr txBox="1"/>
+          <p:nvPr/>
+        </p:nvSpPr>
+        <p:spPr>
+          <a:xfrm>
+            <a:off x="318977" y="1825531"/>
+            <a:ext cx="8039211" cy="4832092"/>
+          </a:xfrm>
+          <a:prstGeom prst="rect">
+            <a:avLst/>
+          </a:prstGeom>
+          <a:noFill/>
+          <a:ln>
+            <a:solidFill>
+              <a:schemeClr val="tx1"/>
+            </a:solidFill>
+          </a:ln>
+        </p:spPr>
+        <p:txBody>
+          <a:bodyPr wrap="square" rtlCol="0">
+            <a:spAutoFit/>
+          </a:bodyPr>
+          <a:lstStyle/>
+          <a:p>
+            <a:pPr marL="285750" indent="-285750">
+              <a:buFont typeface="Arial" panose="020B0604020202020204" pitchFamily="34" charset="0"/>
+              <a:buChar char="•"/>
+            </a:pPr>
+            <a:r>
+              <a:rPr lang="en-GB" sz="1400" dirty="0"/>
+              <a:t>If statement #1: </a:t>
+            </a:r>
+          </a:p>
+          <a:p>
+            <a:pPr marL="742950" lvl="1" indent="-285750">
+              <a:buFont typeface="Arial" panose="020B0604020202020204" pitchFamily="34" charset="0"/>
+              <a:buChar char="•"/>
+            </a:pPr>
+            <a:r>
+              <a:rPr lang="en-GB" sz="1400" dirty="0" err="1"/>
+              <a:t>faied</a:t>
+            </a:r>
+            <a:r>
+              <a:rPr lang="en-GB" sz="1400" dirty="0"/>
+              <a:t> since {</a:t>
+            </a:r>
+            <a:r>
+              <a:rPr lang="en-GB" sz="1400" dirty="0" err="1"/>
+              <a:t>leftTextQuery</a:t>
+            </a:r>
+            <a:r>
+              <a:rPr lang="en-GB" sz="1400" dirty="0"/>
+              <a:t> = false}  != true</a:t>
+            </a:r>
+          </a:p>
+          <a:p>
+            <a:pPr marL="742950" lvl="1" indent="-285750">
+              <a:buFont typeface="Arial" panose="020B0604020202020204" pitchFamily="34" charset="0"/>
+              <a:buChar char="•"/>
+            </a:pPr>
+            <a:r>
+              <a:rPr lang="en-GB" sz="1400" dirty="0"/>
+              <a:t>So enter the else statement:</a:t>
+            </a:r>
+          </a:p>
+          <a:p>
+            <a:pPr marL="1200150" lvl="2" indent="-285750">
+              <a:buFont typeface="Arial" panose="020B0604020202020204" pitchFamily="34" charset="0"/>
+              <a:buChar char="•"/>
+            </a:pPr>
+            <a:r>
+              <a:rPr lang="en-GB" sz="1400" dirty="0" err="1"/>
+              <a:t>EntireString</a:t>
+            </a:r>
+            <a:r>
+              <a:rPr lang="en-GB" sz="1400" dirty="0"/>
+              <a:t> = </a:t>
+            </a:r>
+            <a:r>
+              <a:rPr lang="en-GB" sz="1400" dirty="0" err="1"/>
+              <a:t>rightText.get</a:t>
+            </a:r>
+            <a:r>
+              <a:rPr lang="en-GB" sz="1400" dirty="0"/>
+              <a:t>(0)</a:t>
+            </a:r>
+          </a:p>
+          <a:p>
+            <a:pPr lvl="3"/>
+            <a:r>
+              <a:rPr lang="en-GB" sz="1400" dirty="0"/>
+              <a:t>                  = “</a:t>
+            </a:r>
+            <a:r>
+              <a:rPr lang="en-US" sz="1400" dirty="0"/>
+              <a:t>line number 2. This is left line number 2. This is left line number 2. 		            This is right line number 1. This is right line number 1.”</a:t>
+            </a:r>
+          </a:p>
+          <a:p>
+            <a:pPr marL="1200150" lvl="2" indent="-285750">
+              <a:buFont typeface="Arial" panose="020B0604020202020204" pitchFamily="34" charset="0"/>
+              <a:buChar char="•"/>
+            </a:pPr>
+            <a:r>
+              <a:rPr lang="en-US" sz="1400" dirty="0" err="1"/>
+              <a:t>formatInfoForTheString</a:t>
+            </a:r>
+            <a:r>
+              <a:rPr lang="en-US" sz="1400" dirty="0"/>
+              <a:t> = [-1]</a:t>
+            </a:r>
+          </a:p>
+          <a:p>
+            <a:pPr marL="1200150" lvl="2" indent="-285750">
+              <a:buFont typeface="Arial" panose="020B0604020202020204" pitchFamily="34" charset="0"/>
+              <a:buChar char="•"/>
+            </a:pPr>
+            <a:r>
+              <a:rPr lang="en-US" sz="1400" dirty="0"/>
+              <a:t>Inner if statement:</a:t>
+            </a:r>
+          </a:p>
+          <a:p>
+            <a:pPr marL="1657350" lvl="3" indent="-285750">
+              <a:buFont typeface="Arial" panose="020B0604020202020204" pitchFamily="34" charset="0"/>
+              <a:buChar char="•"/>
+            </a:pPr>
+            <a:r>
+              <a:rPr lang="en-US" sz="1400" dirty="0"/>
+              <a:t>Passed since looking at the first index of the right side</a:t>
+            </a:r>
+          </a:p>
+          <a:p>
+            <a:pPr marL="2114550" lvl="4" indent="-285750">
+              <a:buFont typeface="Arial" panose="020B0604020202020204" pitchFamily="34" charset="0"/>
+              <a:buChar char="•"/>
+            </a:pPr>
+            <a:r>
+              <a:rPr lang="en-US" sz="1400" dirty="0" err="1"/>
+              <a:t>lastFormatInfoForTheLeftText</a:t>
+            </a:r>
+            <a:r>
+              <a:rPr lang="en-US" sz="1400" dirty="0"/>
+              <a:t> = [-1]</a:t>
+            </a:r>
+          </a:p>
+          <a:p>
+            <a:pPr marL="2114550" lvl="4" indent="-285750">
+              <a:buFont typeface="Arial" panose="020B0604020202020204" pitchFamily="34" charset="0"/>
+              <a:buChar char="•"/>
+            </a:pPr>
+            <a:r>
+              <a:rPr lang="en-US" sz="1400" dirty="0" err="1"/>
+              <a:t>lastFormatNewLineForTheLeftText</a:t>
+            </a:r>
+            <a:r>
+              <a:rPr lang="en-US" sz="1400" dirty="0"/>
+              <a:t> = -1</a:t>
+            </a:r>
+          </a:p>
+          <a:p>
+            <a:pPr marL="2114550" lvl="4" indent="-285750">
+              <a:buFont typeface="Arial" panose="020B0604020202020204" pitchFamily="34" charset="0"/>
+              <a:buChar char="•"/>
+            </a:pPr>
+            <a:r>
+              <a:rPr lang="en-US" sz="1400" dirty="0"/>
+              <a:t>Nested if statement:</a:t>
+            </a:r>
+          </a:p>
+          <a:p>
+            <a:pPr marL="2571750" lvl="5" indent="-285750">
+              <a:buFont typeface="Arial" panose="020B0604020202020204" pitchFamily="34" charset="0"/>
+              <a:buChar char="•"/>
+            </a:pPr>
+            <a:r>
+              <a:rPr lang="en-US" sz="1400" dirty="0"/>
+              <a:t>Failed since there are no newlines for the last entry for the left text:</a:t>
+            </a:r>
+          </a:p>
+          <a:p>
+            <a:pPr marL="3028950" lvl="6" indent="-285750">
+              <a:buFont typeface="Arial" panose="020B0604020202020204" pitchFamily="34" charset="0"/>
+              <a:buChar char="•"/>
+            </a:pPr>
+            <a:r>
+              <a:rPr lang="en-US" sz="1400" dirty="0" err="1"/>
+              <a:t>lastLineFromLeftText</a:t>
+            </a:r>
+            <a:r>
+              <a:rPr lang="en-US" sz="1400" dirty="0"/>
+              <a:t> = </a:t>
+            </a:r>
+            <a:r>
+              <a:rPr lang="en-GB" sz="1400" dirty="0"/>
+              <a:t>“This is left”</a:t>
+            </a:r>
+          </a:p>
+          <a:p>
+            <a:pPr marL="2571750" lvl="5" indent="-285750">
+              <a:buFont typeface="Arial" panose="020B0604020202020204" pitchFamily="34" charset="0"/>
+              <a:buChar char="•"/>
+            </a:pPr>
+            <a:r>
+              <a:rPr lang="en-US" sz="1400" dirty="0" err="1"/>
+              <a:t>textStartRelativeToBoxX</a:t>
+            </a:r>
+            <a:r>
+              <a:rPr lang="en-US" sz="1400" dirty="0"/>
+              <a:t> = {num. characters} * {given character width)</a:t>
+            </a:r>
+          </a:p>
+          <a:p>
+            <a:pPr lvl="6"/>
+            <a:r>
+              <a:rPr lang="en-US" sz="1400" dirty="0"/>
+              <a:t>	                 = 12*5</a:t>
+            </a:r>
+          </a:p>
+          <a:p>
+            <a:pPr lvl="6"/>
+            <a:r>
+              <a:rPr lang="en-US" sz="1400" dirty="0"/>
+              <a:t>	                 = 60</a:t>
+            </a:r>
+          </a:p>
+          <a:p>
+            <a:pPr marL="285750" indent="-285750">
+              <a:buFont typeface="Arial" panose="020B0604020202020204" pitchFamily="34" charset="0"/>
+              <a:buChar char="•"/>
+            </a:pPr>
+            <a:r>
+              <a:rPr lang="en-US" sz="1400" dirty="0" err="1"/>
+              <a:t>StringToCheck</a:t>
+            </a:r>
+            <a:r>
+              <a:rPr lang="en-US" sz="1400" dirty="0"/>
+              <a:t> = </a:t>
+            </a:r>
+            <a:r>
+              <a:rPr lang="en-GB" sz="1400" dirty="0"/>
+              <a:t>“</a:t>
+            </a:r>
+            <a:r>
+              <a:rPr lang="en-US" sz="1400" dirty="0"/>
+              <a:t>line number 2. This is left line number 2. This is left line number 2. 		         This is right line number 1. This is right line number 1.”</a:t>
+            </a:r>
+          </a:p>
+          <a:p>
+            <a:pPr marL="285750" indent="-285750">
+              <a:buFont typeface="Arial" panose="020B0604020202020204" pitchFamily="34" charset="0"/>
+              <a:buChar char="•"/>
+            </a:pPr>
+            <a:r>
+              <a:rPr lang="en-US" sz="1400" dirty="0" err="1"/>
+              <a:t>lastFormattingEntry</a:t>
+            </a:r>
+            <a:r>
+              <a:rPr lang="en-US" sz="1400" dirty="0"/>
+              <a:t> = [-1]</a:t>
+            </a:r>
+          </a:p>
+          <a:p>
+            <a:pPr marL="285750" indent="-285750">
+              <a:buFont typeface="Arial" panose="020B0604020202020204" pitchFamily="34" charset="0"/>
+              <a:buChar char="•"/>
+            </a:pPr>
+            <a:r>
+              <a:rPr lang="en-US" sz="1400" dirty="0"/>
+              <a:t>If statement #2:</a:t>
+            </a:r>
+          </a:p>
+          <a:p>
+            <a:pPr marL="742950" lvl="1" indent="-285750">
+              <a:buFont typeface="Arial" panose="020B0604020202020204" pitchFamily="34" charset="0"/>
+              <a:buChar char="•"/>
+            </a:pPr>
+            <a:r>
+              <a:rPr lang="en-US" sz="1400" dirty="0"/>
+              <a:t>Failed since (</a:t>
+            </a:r>
+            <a:r>
+              <a:rPr lang="en-US" sz="1400" dirty="0" err="1"/>
+              <a:t>checkAfterLastFormatEntry</a:t>
+            </a:r>
+            <a:r>
+              <a:rPr lang="en-US" sz="1400" dirty="0"/>
+              <a:t> == false)</a:t>
+            </a:r>
+          </a:p>
+        </p:txBody>
+      </p:sp>
     </p:spTree>
     <p:extLst>
       <p:ext uri="{BB962C8B-B14F-4D97-AF65-F5344CB8AC3E}">
         <p14:creationId xmlns:p14="http://schemas.microsoft.com/office/powerpoint/2010/main" val="2718918639"/>
+      </p:ext>
+    </p:extLst>
+  </p:cSld>
+  <p:clrMapOvr>
+    <a:masterClrMapping/>
+  </p:clrMapOvr>
+</p:sld>
+</file>
+
+<file path=ppt/slides/slide17.xml><?xml version="1.0" encoding="utf-8"?>
+<p:sld xmlns:a="http://schemas.openxmlformats.org/drawingml/2006/main" xmlns:r="http://schemas.openxmlformats.org/officeDocument/2006/relationships" xmlns:p="http://schemas.openxmlformats.org/presentationml/2006/main">
+  <p:cSld>
+    <p:spTree>
+      <p:nvGrpSpPr>
+        <p:cNvPr id="1" name=""/>
+        <p:cNvGrpSpPr/>
+        <p:nvPr/>
+      </p:nvGrpSpPr>
+      <p:grpSpPr>
+        <a:xfrm>
+          <a:off x="0" y="0"/>
+          <a:ext cx="0" cy="0"/>
+          <a:chOff x="0" y="0"/>
+          <a:chExt cx="0" cy="0"/>
+        </a:xfrm>
+      </p:grpSpPr>
+      <p:sp>
+        <p:nvSpPr>
+          <p:cNvPr id="2" name="TextBox 1">
+            <a:extLst>
+              <a:ext uri="{FF2B5EF4-FFF2-40B4-BE49-F238E27FC236}">
+                <a16:creationId xmlns:a16="http://schemas.microsoft.com/office/drawing/2014/main" id="{7C11679B-5313-CD4A-BEBA-B2F83212BADF}"/>
+              </a:ext>
+            </a:extLst>
+          </p:cNvPr>
+          <p:cNvSpPr txBox="1"/>
+          <p:nvPr/>
+        </p:nvSpPr>
+        <p:spPr>
+          <a:xfrm>
+            <a:off x="190388" y="208863"/>
+            <a:ext cx="7540833" cy="4401205"/>
+          </a:xfrm>
+          <a:prstGeom prst="rect">
+            <a:avLst/>
+          </a:prstGeom>
+          <a:noFill/>
+          <a:ln>
+            <a:solidFill>
+              <a:schemeClr val="tx1"/>
+            </a:solidFill>
+          </a:ln>
+        </p:spPr>
+        <p:txBody>
+          <a:bodyPr wrap="square" rtlCol="0">
+            <a:spAutoFit/>
+          </a:bodyPr>
+          <a:lstStyle/>
+          <a:p>
+            <a:pPr marL="285750" indent="-285750">
+              <a:buFont typeface="Arial" panose="020B0604020202020204" pitchFamily="34" charset="0"/>
+              <a:buChar char="•"/>
+            </a:pPr>
+            <a:r>
+              <a:rPr lang="en-GB" sz="1400" dirty="0"/>
+              <a:t>while loop [0]</a:t>
+            </a:r>
+          </a:p>
+          <a:p>
+            <a:pPr marL="742950" lvl="1" indent="-285750">
+              <a:buFont typeface="Arial" panose="020B0604020202020204" pitchFamily="34" charset="0"/>
+              <a:buChar char="•"/>
+            </a:pPr>
+            <a:r>
+              <a:rPr lang="en-GB" sz="1400" dirty="0"/>
+              <a:t>Outer if:</a:t>
+            </a:r>
+          </a:p>
+          <a:p>
+            <a:pPr marL="1200150" lvl="2" indent="-285750">
+              <a:buFont typeface="Arial" panose="020B0604020202020204" pitchFamily="34" charset="0"/>
+              <a:buChar char="•"/>
+            </a:pPr>
+            <a:r>
+              <a:rPr lang="en-GB" sz="1400" dirty="0"/>
+              <a:t>Passed since that last formatting entry is -1</a:t>
+            </a:r>
+          </a:p>
+          <a:p>
+            <a:pPr marL="1657350" lvl="3" indent="-285750">
+              <a:buFont typeface="Arial" panose="020B0604020202020204" pitchFamily="34" charset="0"/>
+              <a:buChar char="•"/>
+            </a:pPr>
+            <a:r>
+              <a:rPr lang="en-GB" sz="1400" dirty="0" err="1"/>
+              <a:t>stringToCheckSize</a:t>
+            </a:r>
+            <a:r>
+              <a:rPr lang="en-GB" sz="1400" dirty="0"/>
+              <a:t> = {num. characters} * {assumed char width}</a:t>
+            </a:r>
+          </a:p>
+          <a:p>
+            <a:pPr lvl="3"/>
+            <a:r>
+              <a:rPr lang="en-GB" sz="1400" dirty="0"/>
+              <a:t>		      = 127 * 5</a:t>
+            </a:r>
+          </a:p>
+          <a:p>
+            <a:pPr lvl="3"/>
+            <a:r>
+              <a:rPr lang="en-GB" sz="1400" dirty="0"/>
+              <a:t>		      = 635</a:t>
+            </a:r>
+          </a:p>
+          <a:p>
+            <a:pPr marL="1657350" lvl="3" indent="-285750">
+              <a:buFont typeface="Arial" panose="020B0604020202020204" pitchFamily="34" charset="0"/>
+              <a:buChar char="•"/>
+            </a:pPr>
+            <a:r>
+              <a:rPr lang="en-GB" sz="1400" dirty="0"/>
+              <a:t>Inner if:</a:t>
+            </a:r>
+          </a:p>
+          <a:p>
+            <a:pPr marL="2114550" lvl="4" indent="-285750">
+              <a:buFont typeface="Arial" panose="020B0604020202020204" pitchFamily="34" charset="0"/>
+              <a:buChar char="•"/>
+            </a:pPr>
+            <a:r>
+              <a:rPr lang="en-GB" sz="1400" dirty="0"/>
+              <a:t>*(note: assuming </a:t>
+            </a:r>
+            <a:r>
+              <a:rPr lang="en-GB" sz="1400" dirty="0" err="1"/>
+              <a:t>boxW</a:t>
+            </a:r>
+            <a:r>
+              <a:rPr lang="en-GB" sz="1400" dirty="0"/>
+              <a:t> = 41 chars wide = 41* 5 = 2-5)*</a:t>
+            </a:r>
+          </a:p>
+          <a:p>
+            <a:pPr marL="2114550" lvl="4" indent="-285750">
+              <a:buFont typeface="Arial" panose="020B0604020202020204" pitchFamily="34" charset="0"/>
+              <a:buChar char="•"/>
+            </a:pPr>
+            <a:r>
+              <a:rPr lang="en-GB" sz="1400" dirty="0"/>
+              <a:t>Passed since: {</a:t>
+            </a:r>
+            <a:r>
+              <a:rPr lang="en-GB" sz="1400" dirty="0" err="1"/>
+              <a:t>stringToCheckSize</a:t>
+            </a:r>
+            <a:r>
+              <a:rPr lang="en-GB" sz="1400" dirty="0"/>
+              <a:t> = 635} &gt; {</a:t>
+            </a:r>
+            <a:r>
+              <a:rPr lang="en-GB" sz="1400" dirty="0" err="1"/>
+              <a:t>boxW</a:t>
+            </a:r>
+            <a:r>
+              <a:rPr lang="en-GB" sz="1400" dirty="0"/>
+              <a:t> = 205}</a:t>
+            </a:r>
+          </a:p>
+          <a:p>
+            <a:pPr marL="2571750" lvl="5" indent="-285750">
+              <a:buFont typeface="Arial" panose="020B0604020202020204" pitchFamily="34" charset="0"/>
+              <a:buChar char="•"/>
+            </a:pPr>
+            <a:r>
+              <a:rPr lang="en-GB" sz="1400" dirty="0" err="1"/>
+              <a:t>newSplitPosition</a:t>
+            </a:r>
+            <a:r>
+              <a:rPr lang="en-GB" sz="1400" dirty="0"/>
+              <a:t> = </a:t>
+            </a:r>
+            <a:r>
+              <a:rPr lang="en-US" sz="1400" dirty="0" err="1"/>
+              <a:t>findOverHangEntryFromAvgCharWidth</a:t>
+            </a:r>
+            <a:r>
+              <a:rPr lang="en-GB" sz="1400" dirty="0"/>
+              <a:t>(“</a:t>
+            </a:r>
+            <a:r>
+              <a:rPr lang="en-US" sz="1400" dirty="0"/>
+              <a:t>line number 2. This is left line number 2. This is left line number 2. 		         This is right line number 1. This is right line number 1.” , 635, 5, 60)</a:t>
+            </a:r>
+          </a:p>
+          <a:p>
+            <a:pPr marL="2571750" lvl="5" indent="-285750">
+              <a:buFont typeface="Arial" panose="020B0604020202020204" pitchFamily="34" charset="0"/>
+              <a:buChar char="•"/>
+            </a:pPr>
+            <a:r>
+              <a:rPr lang="en-US" sz="1400" dirty="0"/>
+              <a:t>So:</a:t>
+            </a:r>
+          </a:p>
+          <a:p>
+            <a:pPr marL="2571750" lvl="5" indent="-285750">
+              <a:buFont typeface="Arial" panose="020B0604020202020204" pitchFamily="34" charset="0"/>
+              <a:buChar char="•"/>
+            </a:pPr>
+            <a:r>
+              <a:rPr lang="en-US" sz="1400" dirty="0" err="1"/>
+              <a:t>newSplitPosition</a:t>
+            </a:r>
+            <a:r>
+              <a:rPr lang="en-US" sz="1400" dirty="0"/>
+              <a:t> = 22</a:t>
+            </a:r>
+          </a:p>
+          <a:p>
+            <a:pPr marL="2571750" lvl="5" indent="-285750">
+              <a:buFont typeface="Arial" panose="020B0604020202020204" pitchFamily="34" charset="0"/>
+              <a:buChar char="•"/>
+            </a:pPr>
+            <a:r>
+              <a:rPr lang="en-US" sz="1400" dirty="0" err="1"/>
+              <a:t>formatInfoForTheString.set</a:t>
+            </a:r>
+            <a:r>
+              <a:rPr lang="en-US" sz="1400" dirty="0"/>
+              <a:t>(0, 22) //sets the first entry of the format info for this line to 22.</a:t>
+            </a:r>
+          </a:p>
+          <a:p>
+            <a:pPr marL="2571750" lvl="5" indent="-285750">
+              <a:buFont typeface="Arial" panose="020B0604020202020204" pitchFamily="34" charset="0"/>
+              <a:buChar char="•"/>
+            </a:pPr>
+            <a:r>
+              <a:rPr lang="en-US" sz="1400" dirty="0" err="1"/>
+              <a:t>stringToCheck</a:t>
+            </a:r>
+            <a:r>
+              <a:rPr lang="en-US" sz="1400" dirty="0"/>
+              <a:t> = “left line number 2. This is left line number 2. 		         This is right line number 1. This is right line number 1.” </a:t>
+            </a:r>
+          </a:p>
+          <a:p>
+            <a:pPr marL="2571750" lvl="5" indent="-285750">
+              <a:buFont typeface="Arial" panose="020B0604020202020204" pitchFamily="34" charset="0"/>
+              <a:buChar char="•"/>
+            </a:pPr>
+            <a:endParaRPr lang="en-GB" sz="1400" dirty="0"/>
+          </a:p>
+        </p:txBody>
+      </p:sp>
+    </p:spTree>
+    <p:extLst>
+      <p:ext uri="{BB962C8B-B14F-4D97-AF65-F5344CB8AC3E}">
+        <p14:creationId xmlns:p14="http://schemas.microsoft.com/office/powerpoint/2010/main" val="1995574382"/>
+      </p:ext>
+    </p:extLst>
+  </p:cSld>
+  <p:clrMapOvr>
+    <a:masterClrMapping/>
+  </p:clrMapOvr>
+</p:sld>
+</file>
+
+<file path=ppt/slides/slide18.xml><?xml version="1.0" encoding="utf-8"?>
+<p:sld xmlns:a="http://schemas.openxmlformats.org/drawingml/2006/main" xmlns:r="http://schemas.openxmlformats.org/officeDocument/2006/relationships" xmlns:p="http://schemas.openxmlformats.org/presentationml/2006/main">
+  <p:cSld>
+    <p:spTree>
+      <p:nvGrpSpPr>
+        <p:cNvPr id="1" name=""/>
+        <p:cNvGrpSpPr/>
+        <p:nvPr/>
+      </p:nvGrpSpPr>
+      <p:grpSpPr>
+        <a:xfrm>
+          <a:off x="0" y="0"/>
+          <a:ext cx="0" cy="0"/>
+          <a:chOff x="0" y="0"/>
+          <a:chExt cx="0" cy="0"/>
+        </a:xfrm>
+      </p:grpSpPr>
+      <p:sp>
+        <p:nvSpPr>
+          <p:cNvPr id="2" name="TextBox 1">
+            <a:extLst>
+              <a:ext uri="{FF2B5EF4-FFF2-40B4-BE49-F238E27FC236}">
+                <a16:creationId xmlns:a16="http://schemas.microsoft.com/office/drawing/2014/main" id="{BC202161-14EE-4548-B787-87C19E4BF875}"/>
+              </a:ext>
+            </a:extLst>
+          </p:cNvPr>
+          <p:cNvSpPr txBox="1"/>
+          <p:nvPr/>
+        </p:nvSpPr>
+        <p:spPr>
+          <a:xfrm>
+            <a:off x="157162" y="86200"/>
+            <a:ext cx="7540833" cy="3754874"/>
+          </a:xfrm>
+          <a:prstGeom prst="rect">
+            <a:avLst/>
+          </a:prstGeom>
+          <a:noFill/>
+          <a:ln>
+            <a:solidFill>
+              <a:schemeClr val="tx1"/>
+            </a:solidFill>
+          </a:ln>
+        </p:spPr>
+        <p:txBody>
+          <a:bodyPr wrap="square" rtlCol="0">
+            <a:spAutoFit/>
+          </a:bodyPr>
+          <a:lstStyle/>
+          <a:p>
+            <a:pPr marL="285750" indent="-285750">
+              <a:buFont typeface="Arial" panose="020B0604020202020204" pitchFamily="34" charset="0"/>
+              <a:buChar char="•"/>
+            </a:pPr>
+            <a:r>
+              <a:rPr lang="en-GB" sz="1400" dirty="0"/>
+              <a:t>while loop [1]</a:t>
+            </a:r>
+          </a:p>
+          <a:p>
+            <a:pPr marL="742950" lvl="1" indent="-285750">
+              <a:buFont typeface="Arial" panose="020B0604020202020204" pitchFamily="34" charset="0"/>
+              <a:buChar char="•"/>
+            </a:pPr>
+            <a:r>
+              <a:rPr lang="en-GB" sz="1400" dirty="0"/>
+              <a:t>Outer if:</a:t>
+            </a:r>
+          </a:p>
+          <a:p>
+            <a:pPr marL="1200150" lvl="2" indent="-285750">
+              <a:buFont typeface="Arial" panose="020B0604020202020204" pitchFamily="34" charset="0"/>
+              <a:buChar char="•"/>
+            </a:pPr>
+            <a:r>
+              <a:rPr lang="en-GB" sz="1400" dirty="0"/>
+              <a:t>failed since that last formatting entry is 41</a:t>
+            </a:r>
+          </a:p>
+          <a:p>
+            <a:pPr marL="1200150" lvl="2" indent="-285750">
+              <a:buFont typeface="Arial" panose="020B0604020202020204" pitchFamily="34" charset="0"/>
+              <a:buChar char="•"/>
+            </a:pPr>
+            <a:r>
+              <a:rPr lang="en-GB" sz="1400" dirty="0"/>
+              <a:t>So enter else statement:</a:t>
+            </a:r>
+          </a:p>
+          <a:p>
+            <a:pPr marL="1657350" lvl="3" indent="-285750">
+              <a:buFont typeface="Arial" panose="020B0604020202020204" pitchFamily="34" charset="0"/>
+              <a:buChar char="•"/>
+            </a:pPr>
+            <a:r>
+              <a:rPr lang="en-GB" sz="1400" dirty="0" err="1"/>
+              <a:t>stringToCheckSize</a:t>
+            </a:r>
+            <a:r>
+              <a:rPr lang="en-GB" sz="1400" dirty="0"/>
+              <a:t> = 86 * 5</a:t>
+            </a:r>
+          </a:p>
+          <a:p>
+            <a:pPr lvl="3"/>
+            <a:r>
+              <a:rPr lang="en-GB" sz="1400" dirty="0"/>
+              <a:t>		      = 430</a:t>
+            </a:r>
+          </a:p>
+          <a:p>
+            <a:pPr marL="1657350" lvl="3" indent="-285750">
+              <a:buFont typeface="Arial" panose="020B0604020202020204" pitchFamily="34" charset="0"/>
+              <a:buChar char="•"/>
+            </a:pPr>
+            <a:r>
+              <a:rPr lang="en-GB" sz="1400" dirty="0"/>
+              <a:t>Inner if:</a:t>
+            </a:r>
+          </a:p>
+          <a:p>
+            <a:pPr marL="2114550" lvl="4" indent="-285750">
+              <a:buFont typeface="Arial" panose="020B0604020202020204" pitchFamily="34" charset="0"/>
+              <a:buChar char="•"/>
+            </a:pPr>
+            <a:r>
+              <a:rPr lang="en-GB" sz="1400" dirty="0"/>
+              <a:t>Passed since: {</a:t>
+            </a:r>
+            <a:r>
+              <a:rPr lang="en-GB" sz="1400" dirty="0" err="1"/>
+              <a:t>stringToCheckSize</a:t>
+            </a:r>
+            <a:r>
+              <a:rPr lang="en-GB" sz="1400" dirty="0"/>
+              <a:t> = 430} &gt; {</a:t>
+            </a:r>
+            <a:r>
+              <a:rPr lang="en-GB" sz="1400" dirty="0" err="1"/>
+              <a:t>boxW</a:t>
+            </a:r>
+            <a:r>
+              <a:rPr lang="en-GB" sz="1400" dirty="0"/>
+              <a:t> = 205}</a:t>
+            </a:r>
+          </a:p>
+          <a:p>
+            <a:pPr marL="2571750" lvl="5" indent="-285750">
+              <a:buFont typeface="Arial" panose="020B0604020202020204" pitchFamily="34" charset="0"/>
+              <a:buChar char="•"/>
+            </a:pPr>
+            <a:r>
+              <a:rPr lang="en-GB" sz="1400" dirty="0" err="1"/>
+              <a:t>newSplitPosition</a:t>
+            </a:r>
+            <a:r>
+              <a:rPr lang="en-GB" sz="1400" dirty="0"/>
+              <a:t> = </a:t>
+            </a:r>
+            <a:r>
+              <a:rPr lang="en-US" sz="1400" dirty="0" err="1"/>
+              <a:t>findOverHangEntryFromAvgCharWidth</a:t>
+            </a:r>
+            <a:r>
+              <a:rPr lang="en-US" sz="1400" dirty="0"/>
+              <a:t> “left line number 2. This is left line number 2. 		         This is right line number 1. This is right line number 1.” , 430, 5, 0)</a:t>
+            </a:r>
+          </a:p>
+          <a:p>
+            <a:pPr marL="2571750" lvl="5" indent="-285750">
+              <a:buFont typeface="Arial" panose="020B0604020202020204" pitchFamily="34" charset="0"/>
+              <a:buChar char="•"/>
+            </a:pPr>
+            <a:r>
+              <a:rPr lang="en-US" sz="1400" dirty="0"/>
+              <a:t>So:</a:t>
+            </a:r>
+          </a:p>
+          <a:p>
+            <a:pPr marL="2571750" lvl="5" indent="-285750">
+              <a:buFont typeface="Arial" panose="020B0604020202020204" pitchFamily="34" charset="0"/>
+              <a:buChar char="•"/>
+            </a:pPr>
+            <a:r>
+              <a:rPr lang="en-US" sz="1400" dirty="0" err="1"/>
+              <a:t>newSplitPosition</a:t>
+            </a:r>
+            <a:r>
+              <a:rPr lang="en-US" sz="1400" dirty="0"/>
+              <a:t> = 63</a:t>
+            </a:r>
+          </a:p>
+          <a:p>
+            <a:pPr marL="2571750" lvl="5" indent="-285750">
+              <a:buFont typeface="Arial" panose="020B0604020202020204" pitchFamily="34" charset="0"/>
+              <a:buChar char="•"/>
+            </a:pPr>
+            <a:r>
+              <a:rPr lang="en-US" sz="1400" dirty="0" err="1"/>
+              <a:t>formatInfoForTheString.add</a:t>
+            </a:r>
+            <a:r>
+              <a:rPr lang="en-US" sz="1400" dirty="0"/>
+              <a:t>(41) //adds 41 to the end of the format array</a:t>
+            </a:r>
+          </a:p>
+          <a:p>
+            <a:pPr marL="2571750" lvl="5" indent="-285750">
+              <a:buFont typeface="Arial" panose="020B0604020202020204" pitchFamily="34" charset="0"/>
+              <a:buChar char="•"/>
+            </a:pPr>
+            <a:r>
+              <a:rPr lang="en-US" sz="1400" dirty="0" err="1"/>
+              <a:t>stringToCheck</a:t>
+            </a:r>
+            <a:r>
+              <a:rPr lang="en-US" sz="1400" dirty="0"/>
+              <a:t> = “liber 2. This is right line number 1. This is right line number 1.” </a:t>
+            </a:r>
+            <a:endParaRPr lang="en-GB" sz="1400" dirty="0"/>
+          </a:p>
+        </p:txBody>
+      </p:sp>
+      <p:sp>
+        <p:nvSpPr>
+          <p:cNvPr id="3" name="TextBox 2">
+            <a:extLst>
+              <a:ext uri="{FF2B5EF4-FFF2-40B4-BE49-F238E27FC236}">
+                <a16:creationId xmlns:a16="http://schemas.microsoft.com/office/drawing/2014/main" id="{46BA2847-DB64-294F-BEF3-669A3D8A48F4}"/>
+              </a:ext>
+            </a:extLst>
+          </p:cNvPr>
+          <p:cNvSpPr txBox="1"/>
+          <p:nvPr/>
+        </p:nvSpPr>
+        <p:spPr>
+          <a:xfrm>
+            <a:off x="157162" y="3963291"/>
+            <a:ext cx="8243888" cy="2893100"/>
+          </a:xfrm>
+          <a:prstGeom prst="rect">
+            <a:avLst/>
+          </a:prstGeom>
+          <a:noFill/>
+          <a:ln>
+            <a:solidFill>
+              <a:schemeClr val="tx1"/>
+            </a:solidFill>
+          </a:ln>
+        </p:spPr>
+        <p:txBody>
+          <a:bodyPr wrap="square" rtlCol="0">
+            <a:spAutoFit/>
+          </a:bodyPr>
+          <a:lstStyle/>
+          <a:p>
+            <a:pPr marL="285750" indent="-285750">
+              <a:buFont typeface="Arial" panose="020B0604020202020204" pitchFamily="34" charset="0"/>
+              <a:buChar char="•"/>
+            </a:pPr>
+            <a:r>
+              <a:rPr lang="en-GB" sz="1400" dirty="0"/>
+              <a:t>while loop [2]</a:t>
+            </a:r>
+          </a:p>
+          <a:p>
+            <a:pPr marL="742950" lvl="1" indent="-285750">
+              <a:buFont typeface="Arial" panose="020B0604020202020204" pitchFamily="34" charset="0"/>
+              <a:buChar char="•"/>
+            </a:pPr>
+            <a:r>
+              <a:rPr lang="en-GB" sz="1400" dirty="0"/>
+              <a:t>Outer if:</a:t>
+            </a:r>
+          </a:p>
+          <a:p>
+            <a:pPr marL="1200150" lvl="2" indent="-285750">
+              <a:buFont typeface="Arial" panose="020B0604020202020204" pitchFamily="34" charset="0"/>
+              <a:buChar char="•"/>
+            </a:pPr>
+            <a:r>
+              <a:rPr lang="en-GB" sz="1400" dirty="0"/>
+              <a:t>failed since that last formatting entry is 41</a:t>
+            </a:r>
+          </a:p>
+          <a:p>
+            <a:pPr marL="1200150" lvl="2" indent="-285750">
+              <a:buFont typeface="Arial" panose="020B0604020202020204" pitchFamily="34" charset="0"/>
+              <a:buChar char="•"/>
+            </a:pPr>
+            <a:r>
+              <a:rPr lang="en-GB" sz="1400" dirty="0"/>
+              <a:t>So enter else statement:</a:t>
+            </a:r>
+          </a:p>
+          <a:p>
+            <a:pPr marL="1657350" lvl="3" indent="-285750">
+              <a:buFont typeface="Arial" panose="020B0604020202020204" pitchFamily="34" charset="0"/>
+              <a:buChar char="•"/>
+            </a:pPr>
+            <a:r>
+              <a:rPr lang="en-GB" sz="1400" dirty="0" err="1"/>
+              <a:t>stringToCheckSize</a:t>
+            </a:r>
+            <a:r>
+              <a:rPr lang="en-GB" sz="1400" dirty="0"/>
+              <a:t> = 225</a:t>
+            </a:r>
+          </a:p>
+          <a:p>
+            <a:pPr marL="1657350" lvl="3" indent="-285750">
+              <a:buFont typeface="Arial" panose="020B0604020202020204" pitchFamily="34" charset="0"/>
+              <a:buChar char="•"/>
+            </a:pPr>
+            <a:r>
+              <a:rPr lang="en-GB" sz="1400" dirty="0"/>
+              <a:t>Inner if:</a:t>
+            </a:r>
+          </a:p>
+          <a:p>
+            <a:pPr marL="2114550" lvl="4" indent="-285750">
+              <a:buFont typeface="Arial" panose="020B0604020202020204" pitchFamily="34" charset="0"/>
+              <a:buChar char="•"/>
+            </a:pPr>
+            <a:r>
+              <a:rPr lang="en-GB" sz="1400" dirty="0"/>
+              <a:t>Passed since: {</a:t>
+            </a:r>
+            <a:r>
+              <a:rPr lang="en-GB" sz="1400" dirty="0" err="1"/>
+              <a:t>stringToCheckSize</a:t>
+            </a:r>
+            <a:r>
+              <a:rPr lang="en-GB" sz="1400" dirty="0"/>
+              <a:t> = 225} &gt; {</a:t>
+            </a:r>
+            <a:r>
+              <a:rPr lang="en-GB" sz="1400" dirty="0" err="1"/>
+              <a:t>boxW</a:t>
+            </a:r>
+            <a:r>
+              <a:rPr lang="en-GB" sz="1400" dirty="0"/>
+              <a:t> = 205}</a:t>
+            </a:r>
+          </a:p>
+          <a:p>
+            <a:pPr marL="2571750" lvl="5" indent="-285750">
+              <a:buFont typeface="Arial" panose="020B0604020202020204" pitchFamily="34" charset="0"/>
+              <a:buChar char="•"/>
+            </a:pPr>
+            <a:r>
+              <a:rPr lang="en-GB" sz="1400" dirty="0" err="1"/>
+              <a:t>newSplitPosition</a:t>
+            </a:r>
+            <a:r>
+              <a:rPr lang="en-GB" sz="1400" dirty="0"/>
+              <a:t> = </a:t>
+            </a:r>
+            <a:r>
+              <a:rPr lang="en-US" sz="1400" dirty="0" err="1"/>
+              <a:t>findOverHangEntryFromAvgCharWidth</a:t>
+            </a:r>
+            <a:r>
+              <a:rPr lang="en-US" sz="1400" dirty="0"/>
+              <a:t>(“liber 2. This is right line number 1. This is right line number 1.” , 225, 5, 0)</a:t>
+            </a:r>
+          </a:p>
+          <a:p>
+            <a:pPr marL="2571750" lvl="5" indent="-285750">
+              <a:buFont typeface="Arial" panose="020B0604020202020204" pitchFamily="34" charset="0"/>
+              <a:buChar char="•"/>
+            </a:pPr>
+            <a:r>
+              <a:rPr lang="en-US" sz="1400" dirty="0"/>
+              <a:t>So:</a:t>
+            </a:r>
+          </a:p>
+          <a:p>
+            <a:pPr marL="2571750" lvl="5" indent="-285750">
+              <a:buFont typeface="Arial" panose="020B0604020202020204" pitchFamily="34" charset="0"/>
+              <a:buChar char="•"/>
+            </a:pPr>
+            <a:r>
+              <a:rPr lang="en-US" sz="1400" dirty="0" err="1"/>
+              <a:t>newSplitPosition</a:t>
+            </a:r>
+            <a:r>
+              <a:rPr lang="en-US" sz="1400" dirty="0"/>
+              <a:t> = 104</a:t>
+            </a:r>
+          </a:p>
+          <a:p>
+            <a:pPr marL="2571750" lvl="5" indent="-285750">
+              <a:buFont typeface="Arial" panose="020B0604020202020204" pitchFamily="34" charset="0"/>
+              <a:buChar char="•"/>
+            </a:pPr>
+            <a:r>
+              <a:rPr lang="en-US" sz="1400" dirty="0" err="1"/>
+              <a:t>formatInfoForTheString.add</a:t>
+            </a:r>
+            <a:r>
+              <a:rPr lang="en-US" sz="1400" dirty="0"/>
+              <a:t>(41</a:t>
+            </a:r>
+          </a:p>
+          <a:p>
+            <a:pPr marL="2571750" lvl="5" indent="-285750">
+              <a:buFont typeface="Arial" panose="020B0604020202020204" pitchFamily="34" charset="0"/>
+              <a:buChar char="•"/>
+            </a:pPr>
+            <a:r>
+              <a:rPr lang="en-US" sz="1400" dirty="0" err="1"/>
+              <a:t>stringToCheck</a:t>
+            </a:r>
+            <a:r>
+              <a:rPr lang="en-US" sz="1400" dirty="0"/>
+              <a:t> = “s is right line number 1.” </a:t>
+            </a:r>
+            <a:endParaRPr lang="en-GB" sz="1400" dirty="0"/>
+          </a:p>
+        </p:txBody>
+      </p:sp>
+    </p:spTree>
+    <p:extLst>
+      <p:ext uri="{BB962C8B-B14F-4D97-AF65-F5344CB8AC3E}">
+        <p14:creationId xmlns:p14="http://schemas.microsoft.com/office/powerpoint/2010/main" val="2185745254"/>
+      </p:ext>
+    </p:extLst>
+  </p:cSld>
+  <p:clrMapOvr>
+    <a:masterClrMapping/>
+  </p:clrMapOvr>
+</p:sld>
+</file>
+
+<file path=ppt/slides/slide19.xml><?xml version="1.0" encoding="utf-8"?>
+<p:sld xmlns:a="http://schemas.openxmlformats.org/drawingml/2006/main" xmlns:r="http://schemas.openxmlformats.org/officeDocument/2006/relationships" xmlns:p="http://schemas.openxmlformats.org/presentationml/2006/main">
+  <p:cSld>
+    <p:spTree>
+      <p:nvGrpSpPr>
+        <p:cNvPr id="1" name=""/>
+        <p:cNvGrpSpPr/>
+        <p:nvPr/>
+      </p:nvGrpSpPr>
+      <p:grpSpPr>
+        <a:xfrm>
+          <a:off x="0" y="0"/>
+          <a:ext cx="0" cy="0"/>
+          <a:chOff x="0" y="0"/>
+          <a:chExt cx="0" cy="0"/>
+        </a:xfrm>
+      </p:grpSpPr>
+      <p:sp>
+        <p:nvSpPr>
+          <p:cNvPr id="2" name="TextBox 1">
+            <a:extLst>
+              <a:ext uri="{FF2B5EF4-FFF2-40B4-BE49-F238E27FC236}">
+                <a16:creationId xmlns:a16="http://schemas.microsoft.com/office/drawing/2014/main" id="{94CED999-944E-6042-8F8A-4BFA97122D59}"/>
+              </a:ext>
+            </a:extLst>
+          </p:cNvPr>
+          <p:cNvSpPr txBox="1"/>
+          <p:nvPr/>
+        </p:nvSpPr>
+        <p:spPr>
+          <a:xfrm>
+            <a:off x="157162" y="277117"/>
+            <a:ext cx="7540833" cy="2246769"/>
+          </a:xfrm>
+          <a:prstGeom prst="rect">
+            <a:avLst/>
+          </a:prstGeom>
+          <a:noFill/>
+          <a:ln>
+            <a:solidFill>
+              <a:schemeClr val="tx1"/>
+            </a:solidFill>
+          </a:ln>
+        </p:spPr>
+        <p:txBody>
+          <a:bodyPr wrap="square" rtlCol="0">
+            <a:spAutoFit/>
+          </a:bodyPr>
+          <a:lstStyle/>
+          <a:p>
+            <a:pPr marL="285750" indent="-285750">
+              <a:buFont typeface="Arial" panose="020B0604020202020204" pitchFamily="34" charset="0"/>
+              <a:buChar char="•"/>
+            </a:pPr>
+            <a:r>
+              <a:rPr lang="en-GB" sz="1400" dirty="0"/>
+              <a:t>while loop [3]</a:t>
+            </a:r>
+          </a:p>
+          <a:p>
+            <a:pPr marL="742950" lvl="1" indent="-285750">
+              <a:buFont typeface="Arial" panose="020B0604020202020204" pitchFamily="34" charset="0"/>
+              <a:buChar char="•"/>
+            </a:pPr>
+            <a:r>
+              <a:rPr lang="en-GB" sz="1400" dirty="0"/>
+              <a:t>Outer if:</a:t>
+            </a:r>
+          </a:p>
+          <a:p>
+            <a:pPr marL="1200150" lvl="2" indent="-285750">
+              <a:buFont typeface="Arial" panose="020B0604020202020204" pitchFamily="34" charset="0"/>
+              <a:buChar char="•"/>
+            </a:pPr>
+            <a:r>
+              <a:rPr lang="en-GB" sz="1400" dirty="0"/>
+              <a:t>failed since that last formatting entry is 41</a:t>
+            </a:r>
+          </a:p>
+          <a:p>
+            <a:pPr marL="1200150" lvl="2" indent="-285750">
+              <a:buFont typeface="Arial" panose="020B0604020202020204" pitchFamily="34" charset="0"/>
+              <a:buChar char="•"/>
+            </a:pPr>
+            <a:r>
+              <a:rPr lang="en-GB" sz="1400" dirty="0"/>
+              <a:t>So enter else statement:</a:t>
+            </a:r>
+          </a:p>
+          <a:p>
+            <a:pPr marL="1657350" lvl="3" indent="-285750">
+              <a:buFont typeface="Arial" panose="020B0604020202020204" pitchFamily="34" charset="0"/>
+              <a:buChar char="•"/>
+            </a:pPr>
+            <a:r>
+              <a:rPr lang="en-GB" sz="1400" dirty="0" err="1"/>
+              <a:t>stringToCheckSize</a:t>
+            </a:r>
+            <a:r>
+              <a:rPr lang="en-GB" sz="1400" dirty="0"/>
+              <a:t> = 125</a:t>
+            </a:r>
+          </a:p>
+          <a:p>
+            <a:pPr marL="1657350" lvl="3" indent="-285750">
+              <a:buFont typeface="Arial" panose="020B0604020202020204" pitchFamily="34" charset="0"/>
+              <a:buChar char="•"/>
+            </a:pPr>
+            <a:r>
+              <a:rPr lang="en-GB" sz="1400" dirty="0"/>
+              <a:t>Inner if:</a:t>
+            </a:r>
+          </a:p>
+          <a:p>
+            <a:pPr marL="2114550" lvl="4" indent="-285750">
+              <a:buFont typeface="Arial" panose="020B0604020202020204" pitchFamily="34" charset="0"/>
+              <a:buChar char="•"/>
+            </a:pPr>
+            <a:r>
+              <a:rPr lang="en-GB" sz="1400" dirty="0"/>
+              <a:t>failed since: {</a:t>
+            </a:r>
+            <a:r>
+              <a:rPr lang="en-GB" sz="1400" dirty="0" err="1"/>
+              <a:t>stringToCheckSize</a:t>
+            </a:r>
+            <a:r>
+              <a:rPr lang="en-GB" sz="1400" dirty="0"/>
+              <a:t> = 125} &lt; {</a:t>
+            </a:r>
+            <a:r>
+              <a:rPr lang="en-GB" sz="1400" dirty="0" err="1"/>
+              <a:t>boxW</a:t>
+            </a:r>
+            <a:r>
+              <a:rPr lang="en-GB" sz="1400" dirty="0"/>
+              <a:t> = 205}</a:t>
+            </a:r>
+          </a:p>
+          <a:p>
+            <a:pPr marL="2114550" lvl="4" indent="-285750">
+              <a:buFont typeface="Arial" panose="020B0604020202020204" pitchFamily="34" charset="0"/>
+              <a:buChar char="•"/>
+            </a:pPr>
+            <a:r>
+              <a:rPr lang="en-GB" sz="1400" dirty="0"/>
+              <a:t>Enter inner else:</a:t>
+            </a:r>
+          </a:p>
+          <a:p>
+            <a:pPr marL="2571750" lvl="5" indent="-285750">
+              <a:buFont typeface="Arial" panose="020B0604020202020204" pitchFamily="34" charset="0"/>
+              <a:buChar char="•"/>
+            </a:pPr>
+            <a:r>
+              <a:rPr lang="en-GB" sz="1400" dirty="0"/>
+              <a:t>Changed = false. </a:t>
+            </a:r>
+          </a:p>
+          <a:p>
+            <a:pPr marL="2571750" lvl="5" indent="-285750">
+              <a:buFont typeface="Arial" panose="020B0604020202020204" pitchFamily="34" charset="0"/>
+              <a:buChar char="•"/>
+            </a:pPr>
+            <a:r>
+              <a:rPr lang="en-GB" sz="1400" dirty="0"/>
+              <a:t>So exit the while loop.</a:t>
+            </a:r>
+          </a:p>
+        </p:txBody>
+      </p:sp>
+      <p:sp>
+        <p:nvSpPr>
+          <p:cNvPr id="5" name="TextBox 4">
+            <a:extLst>
+              <a:ext uri="{FF2B5EF4-FFF2-40B4-BE49-F238E27FC236}">
+                <a16:creationId xmlns:a16="http://schemas.microsoft.com/office/drawing/2014/main" id="{00EA468B-6ECA-8B4D-A022-88A78EDBECE6}"/>
+              </a:ext>
+            </a:extLst>
+          </p:cNvPr>
+          <p:cNvSpPr txBox="1"/>
+          <p:nvPr/>
+        </p:nvSpPr>
+        <p:spPr>
+          <a:xfrm>
+            <a:off x="157161" y="2999304"/>
+            <a:ext cx="7540833" cy="523220"/>
+          </a:xfrm>
+          <a:prstGeom prst="rect">
+            <a:avLst/>
+          </a:prstGeom>
+          <a:noFill/>
+          <a:ln>
+            <a:solidFill>
+              <a:schemeClr val="tx1"/>
+            </a:solidFill>
+          </a:ln>
+        </p:spPr>
+        <p:txBody>
+          <a:bodyPr wrap="square" rtlCol="0">
+            <a:spAutoFit/>
+          </a:bodyPr>
+          <a:lstStyle/>
+          <a:p>
+            <a:r>
+              <a:rPr lang="en-GB" sz="1400" dirty="0"/>
+              <a:t>So overall, the formatting information has been changed to:</a:t>
+            </a:r>
+          </a:p>
+          <a:p>
+            <a:pPr marL="285750" indent="-285750">
+              <a:buFont typeface="Arial" panose="020B0604020202020204" pitchFamily="34" charset="0"/>
+              <a:buChar char="•"/>
+            </a:pPr>
+            <a:r>
+              <a:rPr lang="en-US" sz="1400" dirty="0"/>
+              <a:t>[22, 63, 104, 145]</a:t>
+            </a:r>
+          </a:p>
+        </p:txBody>
+      </p:sp>
+    </p:spTree>
+    <p:extLst>
+      <p:ext uri="{BB962C8B-B14F-4D97-AF65-F5344CB8AC3E}">
+        <p14:creationId xmlns:p14="http://schemas.microsoft.com/office/powerpoint/2010/main" val="940594473"/>
       </p:ext>
     </p:extLst>
   </p:cSld>
@@ -7766,6 +9204,212 @@
     <p:extLst>
       <p:ext uri="{BB962C8B-B14F-4D97-AF65-F5344CB8AC3E}">
         <p14:creationId xmlns:p14="http://schemas.microsoft.com/office/powerpoint/2010/main" val="1986889128"/>
+      </p:ext>
+    </p:extLst>
+  </p:cSld>
+  <p:clrMapOvr>
+    <a:masterClrMapping/>
+  </p:clrMapOvr>
+</p:sld>
+</file>
+
+<file path=ppt/slides/slide20.xml><?xml version="1.0" encoding="utf-8"?>
+<p:sld xmlns:a="http://schemas.openxmlformats.org/drawingml/2006/main" xmlns:r="http://schemas.openxmlformats.org/officeDocument/2006/relationships" xmlns:p="http://schemas.openxmlformats.org/presentationml/2006/main">
+  <p:cSld>
+    <p:spTree>
+      <p:nvGrpSpPr>
+        <p:cNvPr id="1" name=""/>
+        <p:cNvGrpSpPr/>
+        <p:nvPr/>
+      </p:nvGrpSpPr>
+      <p:grpSpPr>
+        <a:xfrm>
+          <a:off x="0" y="0"/>
+          <a:ext cx="0" cy="0"/>
+          <a:chOff x="0" y="0"/>
+          <a:chExt cx="0" cy="0"/>
+        </a:xfrm>
+      </p:grpSpPr>
+      <p:sp>
+        <p:nvSpPr>
+          <p:cNvPr id="2" name="TextBox 1">
+            <a:extLst>
+              <a:ext uri="{FF2B5EF4-FFF2-40B4-BE49-F238E27FC236}">
+                <a16:creationId xmlns:a16="http://schemas.microsoft.com/office/drawing/2014/main" id="{AABAEC4D-8234-7B4A-A1E5-005AA212692C}"/>
+              </a:ext>
+            </a:extLst>
+          </p:cNvPr>
+          <p:cNvSpPr txBox="1"/>
+          <p:nvPr/>
+        </p:nvSpPr>
+        <p:spPr>
+          <a:xfrm>
+            <a:off x="0" y="384177"/>
+            <a:ext cx="8356647" cy="923330"/>
+          </a:xfrm>
+          <a:prstGeom prst="rect">
+            <a:avLst/>
+          </a:prstGeom>
+          <a:noFill/>
+        </p:spPr>
+        <p:txBody>
+          <a:bodyPr wrap="none" rtlCol="0">
+            <a:spAutoFit/>
+          </a:bodyPr>
+          <a:lstStyle/>
+          <a:p>
+            <a:r>
+              <a:rPr lang="en-US" sz="5400" b="1" u="sng" dirty="0"/>
+              <a:t>Method: </a:t>
+            </a:r>
+            <a:r>
+              <a:rPr lang="en-US" sz="5400" b="1" u="sng" dirty="0" err="1"/>
+              <a:t>findOverHangEntry</a:t>
+            </a:r>
+            <a:endParaRPr lang="en-GB" sz="6000" b="1" u="sng" dirty="0"/>
+          </a:p>
+        </p:txBody>
+      </p:sp>
+    </p:spTree>
+    <p:extLst>
+      <p:ext uri="{BB962C8B-B14F-4D97-AF65-F5344CB8AC3E}">
+        <p14:creationId xmlns:p14="http://schemas.microsoft.com/office/powerpoint/2010/main" val="3488098355"/>
+      </p:ext>
+    </p:extLst>
+  </p:cSld>
+  <p:clrMapOvr>
+    <a:masterClrMapping/>
+  </p:clrMapOvr>
+</p:sld>
+</file>
+
+<file path=ppt/slides/slide21.xml><?xml version="1.0" encoding="utf-8"?>
+<p:sld xmlns:a="http://schemas.openxmlformats.org/drawingml/2006/main" xmlns:r="http://schemas.openxmlformats.org/officeDocument/2006/relationships" xmlns:p="http://schemas.openxmlformats.org/presentationml/2006/main">
+  <p:cSld>
+    <p:spTree>
+      <p:nvGrpSpPr>
+        <p:cNvPr id="1" name=""/>
+        <p:cNvGrpSpPr/>
+        <p:nvPr/>
+      </p:nvGrpSpPr>
+      <p:grpSpPr>
+        <a:xfrm>
+          <a:off x="0" y="0"/>
+          <a:ext cx="0" cy="0"/>
+          <a:chOff x="0" y="0"/>
+          <a:chExt cx="0" cy="0"/>
+        </a:xfrm>
+      </p:grpSpPr>
+    </p:spTree>
+    <p:extLst>
+      <p:ext uri="{BB962C8B-B14F-4D97-AF65-F5344CB8AC3E}">
+        <p14:creationId xmlns:p14="http://schemas.microsoft.com/office/powerpoint/2010/main" val="3522100084"/>
+      </p:ext>
+    </p:extLst>
+  </p:cSld>
+  <p:clrMapOvr>
+    <a:masterClrMapping/>
+  </p:clrMapOvr>
+</p:sld>
+</file>
+
+<file path=ppt/slides/slide22.xml><?xml version="1.0" encoding="utf-8"?>
+<p:sld xmlns:a="http://schemas.openxmlformats.org/drawingml/2006/main" xmlns:r="http://schemas.openxmlformats.org/officeDocument/2006/relationships" xmlns:p="http://schemas.openxmlformats.org/presentationml/2006/main">
+  <p:cSld>
+    <p:spTree>
+      <p:nvGrpSpPr>
+        <p:cNvPr id="1" name=""/>
+        <p:cNvGrpSpPr/>
+        <p:nvPr/>
+      </p:nvGrpSpPr>
+      <p:grpSpPr>
+        <a:xfrm>
+          <a:off x="0" y="0"/>
+          <a:ext cx="0" cy="0"/>
+          <a:chOff x="0" y="0"/>
+          <a:chExt cx="0" cy="0"/>
+        </a:xfrm>
+      </p:grpSpPr>
+      <p:sp>
+        <p:nvSpPr>
+          <p:cNvPr id="2" name="TextBox 1">
+            <a:extLst>
+              <a:ext uri="{FF2B5EF4-FFF2-40B4-BE49-F238E27FC236}">
+                <a16:creationId xmlns:a16="http://schemas.microsoft.com/office/drawing/2014/main" id="{08938DBF-E63E-4A42-979D-4CBDF1EFEF23}"/>
+              </a:ext>
+            </a:extLst>
+          </p:cNvPr>
+          <p:cNvSpPr txBox="1"/>
+          <p:nvPr/>
+        </p:nvSpPr>
+        <p:spPr>
+          <a:xfrm>
+            <a:off x="814388" y="628650"/>
+            <a:ext cx="601447" cy="369332"/>
+          </a:xfrm>
+          <a:prstGeom prst="rect">
+            <a:avLst/>
+          </a:prstGeom>
+          <a:noFill/>
+        </p:spPr>
+        <p:txBody>
+          <a:bodyPr wrap="none" rtlCol="0">
+            <a:spAutoFit/>
+          </a:bodyPr>
+          <a:lstStyle/>
+          <a:p>
+            <a:r>
+              <a:rPr lang="en-US" dirty="0"/>
+              <a:t>End.</a:t>
+            </a:r>
+          </a:p>
+        </p:txBody>
+      </p:sp>
+      <p:sp>
+        <p:nvSpPr>
+          <p:cNvPr id="3" name="TextBox 2">
+            <a:extLst>
+              <a:ext uri="{FF2B5EF4-FFF2-40B4-BE49-F238E27FC236}">
+                <a16:creationId xmlns:a16="http://schemas.microsoft.com/office/drawing/2014/main" id="{9E6169EC-B7A0-914B-8A70-F260B4FF40F9}"/>
+              </a:ext>
+            </a:extLst>
+          </p:cNvPr>
+          <p:cNvSpPr txBox="1"/>
+          <p:nvPr/>
+        </p:nvSpPr>
+        <p:spPr>
+          <a:xfrm>
+            <a:off x="814388" y="1428750"/>
+            <a:ext cx="10165668" cy="646331"/>
+          </a:xfrm>
+          <a:prstGeom prst="rect">
+            <a:avLst/>
+          </a:prstGeom>
+          <a:noFill/>
+        </p:spPr>
+        <p:txBody>
+          <a:bodyPr wrap="none" rtlCol="0">
+            <a:spAutoFit/>
+          </a:bodyPr>
+          <a:lstStyle/>
+          <a:p>
+            <a:r>
+              <a:rPr lang="en-US" dirty="0"/>
+              <a:t>Maybe it would be better to have a single string, with lots of formatting info (newlines, cursor position etc)</a:t>
+            </a:r>
+          </a:p>
+          <a:p>
+            <a:r>
+              <a:rPr lang="en-US" dirty="0"/>
+              <a:t>So don’t have to rearrange the left and right parts after a new cursor position click….</a:t>
+            </a:r>
+          </a:p>
+        </p:txBody>
+      </p:sp>
+    </p:spTree>
+    <p:extLst>
+      <p:ext uri="{BB962C8B-B14F-4D97-AF65-F5344CB8AC3E}">
+        <p14:creationId xmlns:p14="http://schemas.microsoft.com/office/powerpoint/2010/main" val="2929392559"/>
       </p:ext>
     </p:extLst>
   </p:cSld>

</xml_diff>